<commit_message>
Updating to trunk revision 373:
Stability update before releasing the code to the academic community.
Includes updates to the user guide, and the paper currently in press in GJI.
Also, fixes 2D MT inversion in MPI; changes the behaviour of apparent
resistivity and phase inversion (linear, NOT log apparent resistivities
expected in the input file); also includes minor corrections to the
Matlab I/O scripts and some cosmetic changes to the makefiles.
</commit_message>
<xml_diff>
--- a/doc/pics/ModularSystemFinal.pptx
+++ b/doc/pics/ModularSystemFinal.pptx
@@ -247,7 +247,7 @@
               <a:pPr>
                 <a:defRPr/>
               </a:pPr>
-              <a:t>8/31/2010</a:t>
+              <a:t>9/16/2011</a:t>
             </a:fld>
             <a:endParaRPr lang="en-US" dirty="0"/>
           </a:p>
@@ -595,6 +595,10 @@
           </p:nvPr>
         </p:nvSpPr>
         <p:spPr bwMode="auto">
+          <a:xfrm>
+            <a:off x="2162175" y="698500"/>
+            <a:ext cx="2622550" cy="3495675"/>
+          </a:xfrm>
           <a:noFill/>
           <a:ln>
             <a:solidFill>
@@ -697,7 +701,7 @@
         </p:nvSpPr>
         <p:spPr>
           <a:xfrm>
-            <a:off x="514350" y="2840569"/>
+            <a:off x="514350" y="2840570"/>
             <a:ext cx="5829300" cy="1960033"/>
           </a:xfrm>
         </p:spPr>
@@ -859,7 +863,7 @@
               <a:pPr>
                 <a:defRPr/>
               </a:pPr>
-              <a:t>8/31/2010</a:t>
+              <a:t>9/16/2011</a:t>
             </a:fld>
             <a:endParaRPr lang="en-US" dirty="0"/>
           </a:p>
@@ -1051,7 +1055,7 @@
               <a:pPr>
                 <a:defRPr/>
               </a:pPr>
-              <a:t>8/31/2010</a:t>
+              <a:t>9/16/2011</a:t>
             </a:fld>
             <a:endParaRPr lang="en-US" dirty="0"/>
           </a:p>
@@ -1153,7 +1157,7 @@
         </p:nvSpPr>
         <p:spPr>
           <a:xfrm>
-            <a:off x="4972050" y="366186"/>
+            <a:off x="4972050" y="366187"/>
             <a:ext cx="1543050" cy="7802033"/>
           </a:xfrm>
         </p:spPr>
@@ -1181,7 +1185,7 @@
         </p:nvSpPr>
         <p:spPr>
           <a:xfrm>
-            <a:off x="342900" y="366186"/>
+            <a:off x="342900" y="366187"/>
             <a:ext cx="4514850" cy="7802033"/>
           </a:xfrm>
         </p:spPr>
@@ -1253,7 +1257,7 @@
               <a:pPr>
                 <a:defRPr/>
               </a:pPr>
-              <a:t>8/31/2010</a:t>
+              <a:t>9/16/2011</a:t>
             </a:fld>
             <a:endParaRPr lang="en-US" dirty="0"/>
           </a:p>
@@ -1445,7 +1449,7 @@
               <a:pPr>
                 <a:defRPr/>
               </a:pPr>
-              <a:t>8/31/2010</a:t>
+              <a:t>9/16/2011</a:t>
             </a:fld>
             <a:endParaRPr lang="en-US" dirty="0"/>
           </a:p>
@@ -1579,7 +1583,7 @@
         </p:nvSpPr>
         <p:spPr>
           <a:xfrm>
-            <a:off x="541735" y="3875620"/>
+            <a:off x="541735" y="3875621"/>
             <a:ext cx="5829300" cy="2000249"/>
           </a:xfrm>
         </p:spPr>
@@ -1713,7 +1717,7 @@
               <a:pPr>
                 <a:defRPr/>
               </a:pPr>
-              <a:t>8/31/2010</a:t>
+              <a:t>9/16/2011</a:t>
             </a:fld>
             <a:endParaRPr lang="en-US" dirty="0"/>
           </a:p>
@@ -1838,7 +1842,7 @@
         </p:nvSpPr>
         <p:spPr>
           <a:xfrm>
-            <a:off x="342900" y="2133602"/>
+            <a:off x="342900" y="2133604"/>
             <a:ext cx="3028950" cy="6034617"/>
           </a:xfrm>
         </p:spPr>
@@ -1923,7 +1927,7 @@
         </p:nvSpPr>
         <p:spPr>
           <a:xfrm>
-            <a:off x="3486150" y="2133602"/>
+            <a:off x="3486150" y="2133604"/>
             <a:ext cx="3028950" cy="6034617"/>
           </a:xfrm>
         </p:spPr>
@@ -2023,7 +2027,7 @@
               <a:pPr>
                 <a:defRPr/>
               </a:pPr>
-              <a:t>8/31/2010</a:t>
+              <a:t>9/16/2011</a:t>
             </a:fld>
             <a:endParaRPr lang="en-US" dirty="0"/>
           </a:p>
@@ -2152,7 +2156,7 @@
         </p:nvSpPr>
         <p:spPr>
           <a:xfrm>
-            <a:off x="342901" y="2046817"/>
+            <a:off x="342902" y="2046817"/>
             <a:ext cx="3030141" cy="853016"/>
           </a:xfrm>
         </p:spPr>
@@ -2217,7 +2221,7 @@
         </p:nvSpPr>
         <p:spPr>
           <a:xfrm>
-            <a:off x="342901" y="2899833"/>
+            <a:off x="342902" y="2899833"/>
             <a:ext cx="3030141" cy="5268384"/>
           </a:xfrm>
         </p:spPr>
@@ -2302,7 +2306,7 @@
         </p:nvSpPr>
         <p:spPr>
           <a:xfrm>
-            <a:off x="3483770" y="2046817"/>
+            <a:off x="3483771" y="2046817"/>
             <a:ext cx="3031331" cy="853016"/>
           </a:xfrm>
         </p:spPr>
@@ -2367,7 +2371,7 @@
         </p:nvSpPr>
         <p:spPr>
           <a:xfrm>
-            <a:off x="3483770" y="2899833"/>
+            <a:off x="3483771" y="2899833"/>
             <a:ext cx="3031331" cy="5268384"/>
           </a:xfrm>
         </p:spPr>
@@ -2467,7 +2471,7 @@
               <a:pPr>
                 <a:defRPr/>
               </a:pPr>
-              <a:t>8/31/2010</a:t>
+              <a:t>9/16/2011</a:t>
             </a:fld>
             <a:endParaRPr lang="en-US" dirty="0"/>
           </a:p>
@@ -2607,7 +2611,7 @@
               <a:pPr>
                 <a:defRPr/>
               </a:pPr>
-              <a:t>8/31/2010</a:t>
+              <a:t>9/16/2011</a:t>
             </a:fld>
             <a:endParaRPr lang="en-US" dirty="0"/>
           </a:p>
@@ -2724,7 +2728,7 @@
               <a:pPr>
                 <a:defRPr/>
               </a:pPr>
-              <a:t>8/31/2010</a:t>
+              <a:t>9/16/2011</a:t>
             </a:fld>
             <a:endParaRPr lang="en-US" dirty="0"/>
           </a:p>
@@ -2826,7 +2830,7 @@
         </p:nvSpPr>
         <p:spPr>
           <a:xfrm>
-            <a:off x="342901" y="364067"/>
+            <a:off x="342902" y="364067"/>
             <a:ext cx="2256235" cy="1549400"/>
           </a:xfrm>
         </p:spPr>
@@ -2858,7 +2862,7 @@
         </p:nvSpPr>
         <p:spPr>
           <a:xfrm>
-            <a:off x="2681288" y="364069"/>
+            <a:off x="2681289" y="364070"/>
             <a:ext cx="3833813" cy="7804151"/>
           </a:xfrm>
         </p:spPr>
@@ -2943,7 +2947,7 @@
         </p:nvSpPr>
         <p:spPr>
           <a:xfrm>
-            <a:off x="342901" y="1913468"/>
+            <a:off x="342902" y="1913470"/>
             <a:ext cx="2256235" cy="6254751"/>
           </a:xfrm>
         </p:spPr>
@@ -3023,7 +3027,7 @@
               <a:pPr>
                 <a:defRPr/>
               </a:pPr>
-              <a:t>8/31/2010</a:t>
+              <a:t>9/16/2011</a:t>
             </a:fld>
             <a:endParaRPr lang="en-US" dirty="0"/>
           </a:p>
@@ -3301,7 +3305,7 @@
               <a:pPr>
                 <a:defRPr/>
               </a:pPr>
-              <a:t>8/31/2010</a:t>
+              <a:t>9/16/2011</a:t>
             </a:fld>
             <a:endParaRPr lang="en-US" dirty="0"/>
           </a:p>
@@ -3520,7 +3524,7 @@
         </p:nvSpPr>
         <p:spPr>
           <a:xfrm>
-            <a:off x="342900" y="8475663"/>
+            <a:off x="342900" y="8475665"/>
             <a:ext cx="1600200" cy="485775"/>
           </a:xfrm>
           <a:prstGeom prst="rect">
@@ -3556,7 +3560,7 @@
               <a:pPr>
                 <a:defRPr/>
               </a:pPr>
-              <a:t>8/31/2010</a:t>
+              <a:t>9/16/2011</a:t>
             </a:fld>
             <a:endParaRPr lang="en-US" dirty="0"/>
           </a:p>
@@ -3574,7 +3578,7 @@
         </p:nvSpPr>
         <p:spPr>
           <a:xfrm>
-            <a:off x="2343150" y="8475663"/>
+            <a:off x="2343150" y="8475665"/>
             <a:ext cx="2171700" cy="485775"/>
           </a:xfrm>
           <a:prstGeom prst="rect">
@@ -3621,7 +3625,7 @@
         </p:nvSpPr>
         <p:spPr>
           <a:xfrm>
-            <a:off x="4914900" y="8475663"/>
+            <a:off x="4914900" y="8475665"/>
             <a:ext cx="1600200" cy="485775"/>
           </a:xfrm>
           <a:prstGeom prst="rect">
@@ -4334,7 +4338,7 @@
         <p:spPr bwMode="auto">
           <a:xfrm>
             <a:off x="2209800" y="7924800"/>
-            <a:ext cx="2514600" cy="369888"/>
+            <a:ext cx="2514600" cy="338554"/>
           </a:xfrm>
           <a:prstGeom prst="rect">
             <a:avLst/>
@@ -4359,11 +4363,14 @@
               </a:spcBef>
             </a:pPr>
             <a:r>
-              <a:rPr lang="en-US" dirty="0">
+              <a:rPr lang="en-US" sz="1600" b="1" dirty="0" smtClean="0">
                 <a:latin typeface="Calibri" pitchFamily="34" charset="0"/>
               </a:rPr>
-              <a:t>ModelSpace</a:t>
-            </a:r>
+              <a:t>Model Space</a:t>
+            </a:r>
+            <a:endParaRPr lang="en-US" sz="1600" b="1" dirty="0">
+              <a:latin typeface="Calibri" pitchFamily="34" charset="0"/>
+            </a:endParaRPr>
           </a:p>
         </p:txBody>
       </p:sp>
@@ -4378,7 +4385,7 @@
         <p:spPr bwMode="auto">
           <a:xfrm>
             <a:off x="5638800" y="8153400"/>
-            <a:ext cx="895350" cy="369888"/>
+            <a:ext cx="895350" cy="369332"/>
           </a:xfrm>
           <a:prstGeom prst="rect">
             <a:avLst/>
@@ -4431,7 +4438,7 @@
         <p:spPr bwMode="auto">
           <a:xfrm>
             <a:off x="2819400" y="457200"/>
-            <a:ext cx="1238250" cy="369888"/>
+            <a:ext cx="1238250" cy="338554"/>
           </a:xfrm>
           <a:prstGeom prst="rect">
             <a:avLst/>
@@ -4456,11 +4463,14 @@
               </a:spcBef>
             </a:pPr>
             <a:r>
-              <a:rPr lang="en-US" dirty="0">
+              <a:rPr lang="en-US" sz="1600" b="1" dirty="0" smtClean="0">
                 <a:latin typeface="Calibri" pitchFamily="34" charset="0"/>
               </a:rPr>
-              <a:t>DataSpace</a:t>
-            </a:r>
+              <a:t>Data Space</a:t>
+            </a:r>
+            <a:endParaRPr lang="en-US" sz="1600" b="1" dirty="0">
+              <a:latin typeface="Calibri" pitchFamily="34" charset="0"/>
+            </a:endParaRPr>
           </a:p>
         </p:txBody>
       </p:sp>
@@ -4474,8 +4484,8 @@
         </p:nvSpPr>
         <p:spPr bwMode="auto">
           <a:xfrm>
-            <a:off x="5867400" y="685800"/>
-            <a:ext cx="358775" cy="369888"/>
+            <a:off x="5867401" y="685800"/>
+            <a:ext cx="358775" cy="369332"/>
           </a:xfrm>
           <a:prstGeom prst="rect">
             <a:avLst/>
@@ -4525,8 +4535,8 @@
         </p:nvCxnSpPr>
         <p:spPr>
           <a:xfrm>
-            <a:off x="2209800" y="2743200"/>
-            <a:ext cx="304800" cy="1588"/>
+            <a:off x="2162175" y="2819400"/>
+            <a:ext cx="419100" cy="9525"/>
           </a:xfrm>
           <a:prstGeom prst="straightConnector1">
             <a:avLst/>
@@ -4560,9 +4570,9 @@
           <p:nvPr/>
         </p:nvCxnSpPr>
         <p:spPr>
-          <a:xfrm rot="16200000" flipH="1">
-            <a:off x="641350" y="1797050"/>
-            <a:ext cx="1311275" cy="3175"/>
+          <a:xfrm flipH="1">
+            <a:off x="1276350" y="1057275"/>
+            <a:ext cx="9525" cy="1495425"/>
           </a:xfrm>
           <a:prstGeom prst="straightConnector1">
             <a:avLst/>
@@ -4599,8 +4609,8 @@
         </p:nvSpPr>
         <p:spPr bwMode="auto">
           <a:xfrm>
-            <a:off x="4038600" y="2667000"/>
-            <a:ext cx="261938" cy="369888"/>
+            <a:off x="4038600" y="2514600"/>
+            <a:ext cx="261938" cy="369332"/>
           </a:xfrm>
           <a:prstGeom prst="rect">
             <a:avLst/>
@@ -4625,7 +4635,7 @@
               </a:spcBef>
             </a:pPr>
             <a:r>
-              <a:rPr lang="en-US" b="1">
+              <a:rPr lang="en-US" b="1" dirty="0">
                 <a:solidFill>
                   <a:schemeClr val="accent2"/>
                 </a:solidFill>
@@ -4633,7 +4643,7 @@
               </a:rPr>
               <a:t>J</a:t>
             </a:r>
-            <a:endParaRPr lang="en-US" b="1" baseline="30000">
+            <a:endParaRPr lang="en-US" b="1" baseline="30000" dirty="0">
               <a:solidFill>
                 <a:schemeClr val="accent2"/>
               </a:solidFill>
@@ -4652,8 +4662,8 @@
         </p:nvSpPr>
         <p:spPr bwMode="auto">
           <a:xfrm>
-            <a:off x="1600200" y="2743200"/>
-            <a:ext cx="609600" cy="369888"/>
+            <a:off x="1676400" y="2438400"/>
+            <a:ext cx="609600" cy="369332"/>
           </a:xfrm>
           <a:prstGeom prst="rect">
             <a:avLst/>
@@ -4678,7 +4688,7 @@
               </a:spcBef>
             </a:pPr>
             <a:r>
-              <a:rPr lang="en-US" b="1">
+              <a:rPr lang="en-US" b="1" dirty="0">
                 <a:solidFill>
                   <a:schemeClr val="accent2"/>
                 </a:solidFill>
@@ -4686,7 +4696,7 @@
               </a:rPr>
               <a:t>L,Q</a:t>
             </a:r>
-            <a:endParaRPr lang="en-US" b="1" baseline="30000">
+            <a:endParaRPr lang="en-US" b="1" baseline="30000" dirty="0">
               <a:solidFill>
                 <a:schemeClr val="accent2"/>
               </a:solidFill>
@@ -4698,15 +4708,13 @@
       <p:cxnSp>
         <p:nvCxnSpPr>
           <p:cNvPr id="34" name="Straight Arrow Connector 33"/>
-          <p:cNvCxnSpPr>
-            <a:endCxn id="3091" idx="2"/>
-          </p:cNvCxnSpPr>
+          <p:cNvCxnSpPr/>
           <p:nvPr/>
         </p:nvCxnSpPr>
         <p:spPr>
-          <a:xfrm rot="16200000" flipV="1">
-            <a:off x="5351462" y="7561263"/>
-            <a:ext cx="422275" cy="0"/>
+          <a:xfrm flipV="1">
+            <a:off x="5553075" y="7410451"/>
+            <a:ext cx="1" cy="419099"/>
           </a:xfrm>
           <a:prstGeom prst="straightConnector1">
             <a:avLst/>
@@ -4741,7 +4749,7 @@
         </p:nvCxnSpPr>
         <p:spPr>
           <a:xfrm>
-            <a:off x="4343400" y="7010400"/>
+            <a:off x="4343400" y="7010401"/>
             <a:ext cx="304800" cy="1588"/>
           </a:xfrm>
           <a:prstGeom prst="straightConnector1">
@@ -4779,8 +4787,8 @@
         </p:nvSpPr>
         <p:spPr bwMode="auto">
           <a:xfrm>
-            <a:off x="3810000" y="6172200"/>
-            <a:ext cx="560388" cy="369888"/>
+            <a:off x="3886200" y="5715000"/>
+            <a:ext cx="560388" cy="369332"/>
           </a:xfrm>
           <a:prstGeom prst="rect">
             <a:avLst/>
@@ -4805,7 +4813,7 @@
               </a:spcBef>
             </a:pPr>
             <a:r>
-              <a:rPr lang="en-US" b="1">
+              <a:rPr lang="en-US" b="1" dirty="0">
                 <a:solidFill>
                   <a:schemeClr val="accent2"/>
                 </a:solidFill>
@@ -4813,7 +4821,7 @@
               </a:rPr>
               <a:t>Λ,T </a:t>
             </a:r>
-            <a:endParaRPr lang="en-US" b="1" baseline="30000">
+            <a:endParaRPr lang="en-US" b="1" baseline="30000" dirty="0">
               <a:solidFill>
                 <a:schemeClr val="accent2"/>
               </a:solidFill>
@@ -4832,8 +4840,8 @@
         </p:nvSpPr>
         <p:spPr bwMode="auto">
           <a:xfrm>
-            <a:off x="4648200" y="6705600"/>
-            <a:ext cx="1828800" cy="644525"/>
+            <a:off x="4600575" y="6734175"/>
+            <a:ext cx="1920240" cy="731520"/>
           </a:xfrm>
           <a:prstGeom prst="rect">
             <a:avLst/>
@@ -4873,8 +4881,8 @@
         </p:nvSpPr>
         <p:spPr bwMode="auto">
           <a:xfrm>
-            <a:off x="4648200" y="6705600"/>
-            <a:ext cx="1752600" cy="400050"/>
+            <a:off x="4572000" y="6934200"/>
+            <a:ext cx="1981200" cy="523220"/>
           </a:xfrm>
           <a:prstGeom prst="rect">
             <a:avLst/>
@@ -4888,7 +4896,7 @@
           </a:ln>
         </p:spPr>
         <p:txBody>
-          <a:bodyPr>
+          <a:bodyPr wrap="square">
             <a:spAutoFit/>
           </a:bodyPr>
           <a:lstStyle/>
@@ -4899,11 +4907,14 @@
               </a:spcBef>
             </a:pPr>
             <a:r>
-              <a:rPr lang="en-US" sz="2000">
+              <a:rPr lang="en-US" sz="1400" dirty="0" smtClean="0">
                 <a:latin typeface="Calibri" pitchFamily="34" charset="0"/>
               </a:rPr>
-              <a:t>ModelMap</a:t>
-            </a:r>
+              <a:t>Mappings from Model Space to Numerical Grid</a:t>
+            </a:r>
+            <a:endParaRPr lang="en-US" sz="1400" dirty="0">
+              <a:latin typeface="Calibri" pitchFamily="34" charset="0"/>
+            </a:endParaRPr>
           </a:p>
         </p:txBody>
       </p:sp>
@@ -4917,8 +4928,8 @@
         </p:nvSpPr>
         <p:spPr bwMode="auto">
           <a:xfrm>
-            <a:off x="5867400" y="7010400"/>
-            <a:ext cx="609600" cy="369888"/>
+            <a:off x="5943600" y="6705600"/>
+            <a:ext cx="609600" cy="369332"/>
           </a:xfrm>
           <a:prstGeom prst="rect">
             <a:avLst/>
@@ -4943,7 +4954,7 @@
               </a:spcBef>
             </a:pPr>
             <a:r>
-              <a:rPr lang="el-GR" b="1">
+              <a:rPr lang="el-GR" b="1" dirty="0">
                 <a:solidFill>
                   <a:schemeClr val="accent2"/>
                 </a:solidFill>
@@ -4952,7 +4963,7 @@
               <a:t>π</a:t>
             </a:r>
             <a:r>
-              <a:rPr lang="en-US" b="1">
+              <a:rPr lang="en-US" b="1" dirty="0">
                 <a:solidFill>
                   <a:schemeClr val="accent2"/>
                 </a:solidFill>
@@ -4960,7 +4971,7 @@
               </a:rPr>
               <a:t>,Π </a:t>
             </a:r>
-            <a:endParaRPr lang="en-US" b="1" baseline="30000">
+            <a:endParaRPr lang="en-US" b="1" baseline="30000" dirty="0">
               <a:solidFill>
                 <a:schemeClr val="accent2"/>
               </a:solidFill>
@@ -4979,8 +4990,8 @@
         </p:nvSpPr>
         <p:spPr bwMode="auto">
           <a:xfrm>
-            <a:off x="2514600" y="6705600"/>
-            <a:ext cx="1828800" cy="644525"/>
+            <a:off x="2466975" y="6734175"/>
+            <a:ext cx="1920240" cy="731520"/>
           </a:xfrm>
           <a:prstGeom prst="rect">
             <a:avLst/>
@@ -5020,8 +5031,8 @@
         </p:nvSpPr>
         <p:spPr bwMode="auto">
           <a:xfrm>
-            <a:off x="381000" y="6705600"/>
-            <a:ext cx="1828800" cy="644525"/>
+            <a:off x="333375" y="6734175"/>
+            <a:ext cx="1920240" cy="731520"/>
           </a:xfrm>
           <a:prstGeom prst="rect">
             <a:avLst/>
@@ -5061,8 +5072,8 @@
         </p:nvSpPr>
         <p:spPr bwMode="auto">
           <a:xfrm>
-            <a:off x="4648200" y="5867400"/>
-            <a:ext cx="1828800" cy="644525"/>
+            <a:off x="4610100" y="5715000"/>
+            <a:ext cx="1920240" cy="731520"/>
           </a:xfrm>
           <a:prstGeom prst="rect">
             <a:avLst/>
@@ -5102,8 +5113,8 @@
         </p:nvSpPr>
         <p:spPr bwMode="auto">
           <a:xfrm>
-            <a:off x="2514600" y="5867400"/>
-            <a:ext cx="1828800" cy="644525"/>
+            <a:off x="2476500" y="5715000"/>
+            <a:ext cx="1920240" cy="731520"/>
           </a:xfrm>
           <a:prstGeom prst="rect">
             <a:avLst/>
@@ -5136,13 +5147,15 @@
       <p:cxnSp>
         <p:nvCxnSpPr>
           <p:cNvPr id="55" name="Straight Arrow Connector 54"/>
-          <p:cNvCxnSpPr/>
+          <p:cNvCxnSpPr>
+            <a:stCxn id="3107" idx="0"/>
+          </p:cNvCxnSpPr>
           <p:nvPr/>
         </p:nvCxnSpPr>
         <p:spPr>
-          <a:xfrm rot="16200000" flipV="1">
-            <a:off x="5249068" y="5530057"/>
-            <a:ext cx="633413" cy="6350"/>
+          <a:xfrm flipH="1" flipV="1">
+            <a:off x="5581650" y="5248275"/>
+            <a:ext cx="19050" cy="466725"/>
           </a:xfrm>
           <a:prstGeom prst="straightConnector1">
             <a:avLst/>
@@ -5179,8 +5192,8 @@
         </p:nvSpPr>
         <p:spPr bwMode="auto">
           <a:xfrm>
-            <a:off x="2514600" y="4572000"/>
-            <a:ext cx="1828800" cy="644525"/>
+            <a:off x="2466975" y="4600575"/>
+            <a:ext cx="1920240" cy="731520"/>
           </a:xfrm>
           <a:prstGeom prst="rect">
             <a:avLst/>
@@ -5220,8 +5233,8 @@
         </p:nvSpPr>
         <p:spPr bwMode="auto">
           <a:xfrm>
-            <a:off x="381000" y="4572000"/>
-            <a:ext cx="1828800" cy="644525"/>
+            <a:off x="333375" y="4600575"/>
+            <a:ext cx="1920240" cy="731520"/>
           </a:xfrm>
           <a:prstGeom prst="rect">
             <a:avLst/>
@@ -5261,8 +5274,8 @@
         </p:nvSpPr>
         <p:spPr bwMode="auto">
           <a:xfrm>
-            <a:off x="4648200" y="3733800"/>
-            <a:ext cx="1828800" cy="1492250"/>
+            <a:off x="4619625" y="3609975"/>
+            <a:ext cx="1914525" cy="1733550"/>
           </a:xfrm>
           <a:prstGeom prst="rect">
             <a:avLst/>
@@ -5286,6 +5299,12 @@
           <a:bodyPr wrap="none" anchor="ctr"/>
           <a:lstStyle/>
           <a:p>
+            <a:r>
+              <a:rPr lang="en-US" dirty="0" smtClean="0">
+                <a:latin typeface="Calibri" pitchFamily="34" charset="0"/>
+              </a:rPr>
+              <a:t>                               </a:t>
+            </a:r>
             <a:endParaRPr lang="en-US" dirty="0">
               <a:latin typeface="Calibri" pitchFamily="34" charset="0"/>
             </a:endParaRPr>
@@ -5302,8 +5321,8 @@
         </p:nvSpPr>
         <p:spPr bwMode="auto">
           <a:xfrm>
-            <a:off x="2514600" y="3733800"/>
-            <a:ext cx="1828800" cy="644525"/>
+            <a:off x="2466975" y="3609975"/>
+            <a:ext cx="1920240" cy="731520"/>
           </a:xfrm>
           <a:prstGeom prst="rect">
             <a:avLst/>
@@ -5336,15 +5355,13 @@
       <p:cxnSp>
         <p:nvCxnSpPr>
           <p:cNvPr id="66" name="Straight Arrow Connector 65"/>
-          <p:cNvCxnSpPr>
-            <a:endCxn id="3104" idx="2"/>
-          </p:cNvCxnSpPr>
+          <p:cNvCxnSpPr/>
           <p:nvPr/>
         </p:nvCxnSpPr>
         <p:spPr>
-          <a:xfrm rot="5400000" flipH="1" flipV="1">
-            <a:off x="3103563" y="3405187"/>
-            <a:ext cx="647700" cy="3175"/>
+          <a:xfrm flipH="1" flipV="1">
+            <a:off x="3429000" y="3095625"/>
+            <a:ext cx="1" cy="600076"/>
           </a:xfrm>
           <a:prstGeom prst="straightConnector1">
             <a:avLst/>
@@ -5381,8 +5398,8 @@
         </p:nvSpPr>
         <p:spPr bwMode="auto">
           <a:xfrm>
-            <a:off x="2514600" y="2438400"/>
-            <a:ext cx="1828800" cy="644525"/>
+            <a:off x="2466975" y="2466975"/>
+            <a:ext cx="1920240" cy="731520"/>
           </a:xfrm>
           <a:prstGeom prst="rect">
             <a:avLst/>
@@ -5422,8 +5439,8 @@
         </p:nvSpPr>
         <p:spPr bwMode="auto">
           <a:xfrm>
-            <a:off x="381000" y="2438400"/>
-            <a:ext cx="1828800" cy="644525"/>
+            <a:off x="333375" y="2466975"/>
+            <a:ext cx="1920240" cy="731520"/>
           </a:xfrm>
           <a:prstGeom prst="rect">
             <a:avLst/>
@@ -5463,8 +5480,8 @@
         </p:nvSpPr>
         <p:spPr bwMode="auto">
           <a:xfrm>
-            <a:off x="2514600" y="1600200"/>
-            <a:ext cx="1828800" cy="644525"/>
+            <a:off x="2466975" y="1533525"/>
+            <a:ext cx="1920240" cy="731520"/>
           </a:xfrm>
           <a:prstGeom prst="rect">
             <a:avLst/>
@@ -5504,8 +5521,8 @@
         </p:nvSpPr>
         <p:spPr bwMode="auto">
           <a:xfrm>
-            <a:off x="4648200" y="5867400"/>
-            <a:ext cx="1752600" cy="400050"/>
+            <a:off x="4724400" y="5715000"/>
+            <a:ext cx="1752600" cy="584775"/>
           </a:xfrm>
           <a:prstGeom prst="rect">
             <a:avLst/>
@@ -5530,11 +5547,14 @@
               </a:spcBef>
             </a:pPr>
             <a:r>
-              <a:rPr lang="en-US" sz="2000">
+              <a:rPr lang="en-US" sz="1600" b="1" dirty="0" smtClean="0">
                 <a:latin typeface="Calibri" pitchFamily="34" charset="0"/>
               </a:rPr>
-              <a:t>EMsolver</a:t>
-            </a:r>
+              <a:t>Numerical Forward Solver</a:t>
+            </a:r>
+            <a:endParaRPr lang="en-US" sz="1600" b="1" dirty="0">
+              <a:latin typeface="Calibri" pitchFamily="34" charset="0"/>
+            </a:endParaRPr>
           </a:p>
         </p:txBody>
       </p:sp>
@@ -5548,8 +5568,8 @@
         </p:nvSpPr>
         <p:spPr bwMode="auto">
           <a:xfrm>
-            <a:off x="4953000" y="4038600"/>
-            <a:ext cx="1143000" cy="708025"/>
+            <a:off x="5029200" y="3657600"/>
+            <a:ext cx="1143000" cy="830997"/>
           </a:xfrm>
           <a:prstGeom prst="rect">
             <a:avLst/>
@@ -5574,11 +5594,20 @@
               </a:spcBef>
             </a:pPr>
             <a:r>
-              <a:rPr lang="en-US" sz="2000">
+              <a:rPr lang="en-US" sz="1600" b="1" dirty="0">
                 <a:latin typeface="Calibri" pitchFamily="34" charset="0"/>
               </a:rPr>
-              <a:t>Forward Solver</a:t>
-            </a:r>
+              <a:t>Forward </a:t>
+            </a:r>
+            <a:r>
+              <a:rPr lang="en-US" sz="1600" b="1" dirty="0" smtClean="0">
+                <a:latin typeface="Calibri" pitchFamily="34" charset="0"/>
+              </a:rPr>
+              <a:t>Solver (Driver)</a:t>
+            </a:r>
+            <a:endParaRPr lang="en-US" sz="1600" b="1" dirty="0">
+              <a:latin typeface="Calibri" pitchFamily="34" charset="0"/>
+            </a:endParaRPr>
           </a:p>
         </p:txBody>
       </p:sp>
@@ -5592,8 +5621,8 @@
         </p:nvSpPr>
         <p:spPr bwMode="auto">
           <a:xfrm>
-            <a:off x="2514600" y="2438400"/>
-            <a:ext cx="1752600" cy="400050"/>
+            <a:off x="2514600" y="2514600"/>
+            <a:ext cx="1752600" cy="584775"/>
           </a:xfrm>
           <a:prstGeom prst="rect">
             <a:avLst/>
@@ -5618,11 +5647,14 @@
               </a:spcBef>
             </a:pPr>
             <a:r>
-              <a:rPr lang="en-US" sz="2000">
+              <a:rPr lang="en-US" sz="1600" b="1" dirty="0" smtClean="0">
                 <a:latin typeface="Calibri" pitchFamily="34" charset="0"/>
               </a:rPr>
-              <a:t>SensComp</a:t>
-            </a:r>
+              <a:t>Jacobian Computations</a:t>
+            </a:r>
+            <a:endParaRPr lang="en-US" sz="1600" b="1" dirty="0">
+              <a:latin typeface="Calibri" pitchFamily="34" charset="0"/>
+            </a:endParaRPr>
           </a:p>
         </p:txBody>
       </p:sp>
@@ -5636,8 +5668,8 @@
         </p:nvSpPr>
         <p:spPr bwMode="auto">
           <a:xfrm>
-            <a:off x="2514600" y="1600200"/>
-            <a:ext cx="1752600" cy="400050"/>
+            <a:off x="2400300" y="1600200"/>
+            <a:ext cx="2057400" cy="584775"/>
           </a:xfrm>
           <a:prstGeom prst="rect">
             <a:avLst/>
@@ -5651,7 +5683,7 @@
           </a:ln>
         </p:spPr>
         <p:txBody>
-          <a:bodyPr>
+          <a:bodyPr wrap="square">
             <a:spAutoFit/>
           </a:bodyPr>
           <a:lstStyle/>
@@ -5662,11 +5694,20 @@
               </a:spcBef>
             </a:pPr>
             <a:r>
-              <a:rPr lang="en-US" sz="2000">
+              <a:rPr lang="en-US" sz="1600" b="1" dirty="0" smtClean="0">
                 <a:latin typeface="Calibri" pitchFamily="34" charset="0"/>
               </a:rPr>
-              <a:t>NLCG etc</a:t>
-            </a:r>
+              <a:t>Inversion Algorithms </a:t>
+            </a:r>
+            <a:r>
+              <a:rPr lang="en-US" sz="1600" dirty="0" smtClean="0">
+                <a:latin typeface="Calibri" pitchFamily="34" charset="0"/>
+              </a:rPr>
+              <a:t>(NLCG, DCG etc)</a:t>
+            </a:r>
+            <a:endParaRPr lang="en-US" sz="1600" dirty="0">
+              <a:latin typeface="Calibri" pitchFamily="34" charset="0"/>
+            </a:endParaRPr>
           </a:p>
         </p:txBody>
       </p:sp>
@@ -5680,8 +5721,8 @@
         </p:nvSpPr>
         <p:spPr bwMode="auto">
           <a:xfrm>
-            <a:off x="381000" y="6705600"/>
-            <a:ext cx="1752600" cy="400050"/>
+            <a:off x="381000" y="6858000"/>
+            <a:ext cx="1752600" cy="338554"/>
           </a:xfrm>
           <a:prstGeom prst="rect">
             <a:avLst/>
@@ -5706,11 +5747,14 @@
               </a:spcBef>
             </a:pPr>
             <a:r>
-              <a:rPr lang="en-US" sz="2000">
+              <a:rPr lang="en-US" sz="1600" b="1" dirty="0" smtClean="0">
                 <a:latin typeface="Calibri" pitchFamily="34" charset="0"/>
               </a:rPr>
-              <a:t>Grid</a:t>
-            </a:r>
+              <a:t>Numerical Grid</a:t>
+            </a:r>
+            <a:endParaRPr lang="en-US" sz="1600" b="1" dirty="0">
+              <a:latin typeface="Calibri" pitchFamily="34" charset="0"/>
+            </a:endParaRPr>
           </a:p>
         </p:txBody>
       </p:sp>
@@ -5724,8 +5768,8 @@
         </p:nvSpPr>
         <p:spPr bwMode="auto">
           <a:xfrm>
-            <a:off x="2514600" y="5867400"/>
-            <a:ext cx="1752600" cy="400050"/>
+            <a:off x="2543175" y="5924550"/>
+            <a:ext cx="1752600" cy="523220"/>
           </a:xfrm>
           <a:prstGeom prst="rect">
             <a:avLst/>
@@ -5750,11 +5794,26 @@
               </a:spcBef>
             </a:pPr>
             <a:r>
-              <a:rPr lang="en-US" sz="2000">
+              <a:rPr lang="en-US" sz="1400" dirty="0" smtClean="0">
                 <a:latin typeface="Calibri" pitchFamily="34" charset="0"/>
               </a:rPr>
-              <a:t>EMfield Interp</a:t>
-            </a:r>
+              <a:t>Interpolation on the </a:t>
+            </a:r>
+            <a:r>
+              <a:rPr lang="en-US" sz="1400" dirty="0" smtClean="0">
+                <a:latin typeface="Calibri" pitchFamily="34" charset="0"/>
+              </a:rPr>
+              <a:t>N</a:t>
+            </a:r>
+            <a:r>
+              <a:rPr lang="en-US" sz="1400" dirty="0" smtClean="0">
+                <a:latin typeface="Calibri" pitchFamily="34" charset="0"/>
+              </a:rPr>
+              <a:t>umerical Grid</a:t>
+            </a:r>
+            <a:endParaRPr lang="en-US" sz="1400" dirty="0">
+              <a:latin typeface="Calibri" pitchFamily="34" charset="0"/>
+            </a:endParaRPr>
           </a:p>
         </p:txBody>
       </p:sp>
@@ -5768,8 +5827,8 @@
         </p:nvSpPr>
         <p:spPr bwMode="auto">
           <a:xfrm>
-            <a:off x="2514600" y="4572000"/>
-            <a:ext cx="1752600" cy="400050"/>
+            <a:off x="2895600" y="4648200"/>
+            <a:ext cx="990600" cy="584775"/>
           </a:xfrm>
           <a:prstGeom prst="rect">
             <a:avLst/>
@@ -5783,7 +5842,7 @@
           </a:ln>
         </p:spPr>
         <p:txBody>
-          <a:bodyPr>
+          <a:bodyPr wrap="square">
             <a:spAutoFit/>
           </a:bodyPr>
           <a:lstStyle/>
@@ -5794,11 +5853,14 @@
               </a:spcBef>
             </a:pPr>
             <a:r>
-              <a:rPr lang="en-US" sz="2000">
+              <a:rPr lang="en-US" sz="1600" b="1" dirty="0" smtClean="0">
                 <a:latin typeface="Calibri" pitchFamily="34" charset="0"/>
               </a:rPr>
-              <a:t>SolnSpace</a:t>
-            </a:r>
+              <a:t>Solution Space</a:t>
+            </a:r>
+            <a:endParaRPr lang="en-US" sz="1600" b="1" dirty="0">
+              <a:latin typeface="Calibri" pitchFamily="34" charset="0"/>
+            </a:endParaRPr>
           </a:p>
         </p:txBody>
       </p:sp>
@@ -5812,8 +5874,8 @@
         </p:nvSpPr>
         <p:spPr bwMode="auto">
           <a:xfrm>
-            <a:off x="2514600" y="3733800"/>
-            <a:ext cx="1752600" cy="400050"/>
+            <a:off x="2971800" y="3657600"/>
+            <a:ext cx="1447800" cy="584775"/>
           </a:xfrm>
           <a:prstGeom prst="rect">
             <a:avLst/>
@@ -5827,7 +5889,7 @@
           </a:ln>
         </p:spPr>
         <p:txBody>
-          <a:bodyPr>
+          <a:bodyPr wrap="square">
             <a:spAutoFit/>
           </a:bodyPr>
           <a:lstStyle/>
@@ -5838,12 +5900,12 @@
               </a:spcBef>
             </a:pPr>
             <a:r>
-              <a:rPr lang="en-US" sz="2000" dirty="0" smtClean="0">
+              <a:rPr lang="en-US" sz="1600" b="1" dirty="0" smtClean="0">
                 <a:latin typeface="Calibri" pitchFamily="34" charset="0"/>
               </a:rPr>
-              <a:t>SolverSens</a:t>
-            </a:r>
-            <a:endParaRPr lang="en-US" sz="2000" dirty="0">
+              <a:t>Solver Sensitivities</a:t>
+            </a:r>
+            <a:endParaRPr lang="en-US" sz="1600" b="1" dirty="0">
               <a:latin typeface="Calibri" pitchFamily="34" charset="0"/>
             </a:endParaRPr>
           </a:p>
@@ -5859,8 +5921,8 @@
         </p:nvSpPr>
         <p:spPr bwMode="auto">
           <a:xfrm>
-            <a:off x="2514600" y="6705600"/>
-            <a:ext cx="1752600" cy="400050"/>
+            <a:off x="2514600" y="6858000"/>
+            <a:ext cx="1752600" cy="338554"/>
           </a:xfrm>
           <a:prstGeom prst="rect">
             <a:avLst/>
@@ -5885,11 +5947,14 @@
               </a:spcBef>
             </a:pPr>
             <a:r>
-              <a:rPr lang="en-US" sz="2000">
+              <a:rPr lang="en-US" sz="1600" b="1" dirty="0" smtClean="0">
                 <a:latin typeface="Calibri" pitchFamily="34" charset="0"/>
               </a:rPr>
-              <a:t>EMfield</a:t>
-            </a:r>
+              <a:t>EM fields</a:t>
+            </a:r>
+            <a:endParaRPr lang="en-US" sz="1600" b="1" dirty="0">
+              <a:latin typeface="Calibri" pitchFamily="34" charset="0"/>
+            </a:endParaRPr>
           </a:p>
         </p:txBody>
       </p:sp>
@@ -5903,8 +5968,8 @@
         </p:nvSpPr>
         <p:spPr bwMode="auto">
           <a:xfrm>
-            <a:off x="381000" y="4572000"/>
-            <a:ext cx="1752600" cy="400050"/>
+            <a:off x="381000" y="4953000"/>
+            <a:ext cx="1752600" cy="338554"/>
           </a:xfrm>
           <a:prstGeom prst="rect">
             <a:avLst/>
@@ -5918,7 +5983,7 @@
           </a:ln>
         </p:spPr>
         <p:txBody>
-          <a:bodyPr>
+          <a:bodyPr wrap="square">
             <a:spAutoFit/>
           </a:bodyPr>
           <a:lstStyle/>
@@ -5929,11 +5994,14 @@
               </a:spcBef>
             </a:pPr>
             <a:r>
-              <a:rPr lang="en-US" sz="2000" dirty="0">
+              <a:rPr lang="en-US" sz="1600" b="1" dirty="0" smtClean="0">
                 <a:latin typeface="Calibri" pitchFamily="34" charset="0"/>
               </a:rPr>
-              <a:t>DataFunc</a:t>
-            </a:r>
+              <a:t>Data Functionals</a:t>
+            </a:r>
+            <a:endParaRPr lang="en-US" sz="1600" b="1" dirty="0">
+              <a:latin typeface="Calibri" pitchFamily="34" charset="0"/>
+            </a:endParaRPr>
           </a:p>
         </p:txBody>
       </p:sp>
@@ -5947,8 +6015,8 @@
         </p:nvSpPr>
         <p:spPr bwMode="auto">
           <a:xfrm>
-            <a:off x="381000" y="2438400"/>
-            <a:ext cx="1752600" cy="400050"/>
+            <a:off x="457200" y="2514600"/>
+            <a:ext cx="1600200" cy="584775"/>
           </a:xfrm>
           <a:prstGeom prst="rect">
             <a:avLst/>
@@ -5962,7 +6030,7 @@
           </a:ln>
         </p:spPr>
         <p:txBody>
-          <a:bodyPr>
+          <a:bodyPr wrap="square">
             <a:spAutoFit/>
           </a:bodyPr>
           <a:lstStyle/>
@@ -5973,11 +6041,14 @@
               </a:spcBef>
             </a:pPr>
             <a:r>
-              <a:rPr lang="en-US" sz="2000">
+              <a:rPr lang="en-US" sz="1600" b="1" dirty="0" smtClean="0">
                 <a:latin typeface="Calibri" pitchFamily="34" charset="0"/>
               </a:rPr>
-              <a:t>DataSens</a:t>
-            </a:r>
+              <a:t>Data Sensitivities</a:t>
+            </a:r>
+            <a:endParaRPr lang="en-US" sz="1600" b="1" dirty="0">
+              <a:latin typeface="Calibri" pitchFamily="34" charset="0"/>
+            </a:endParaRPr>
           </a:p>
         </p:txBody>
       </p:sp>
@@ -5988,9 +6059,9 @@
           <p:nvPr/>
         </p:nvCxnSpPr>
         <p:spPr>
-          <a:xfrm rot="10800000">
-            <a:off x="4343400" y="6526213"/>
-            <a:ext cx="304800" cy="179387"/>
+          <a:xfrm flipH="1" flipV="1">
+            <a:off x="4343400" y="6400801"/>
+            <a:ext cx="304800" cy="380999"/>
           </a:xfrm>
           <a:prstGeom prst="straightConnector1">
             <a:avLst/>
@@ -6024,9 +6095,9 @@
           <p:nvPr/>
         </p:nvCxnSpPr>
         <p:spPr>
-          <a:xfrm>
+          <a:xfrm flipV="1">
             <a:off x="4343400" y="6172200"/>
-            <a:ext cx="304800" cy="1588"/>
+            <a:ext cx="314325" cy="1"/>
           </a:xfrm>
           <a:prstGeom prst="straightConnector1">
             <a:avLst/>
@@ -6063,8 +6134,8 @@
         </p:nvSpPr>
         <p:spPr bwMode="auto">
           <a:xfrm>
-            <a:off x="3810000" y="4876800"/>
-            <a:ext cx="482600" cy="369888"/>
+            <a:off x="3886200" y="4572000"/>
+            <a:ext cx="482600" cy="369332"/>
           </a:xfrm>
           <a:prstGeom prst="rect">
             <a:avLst/>
@@ -6089,7 +6160,7 @@
               </a:spcBef>
             </a:pPr>
             <a:r>
-              <a:rPr lang="en-US" b="1">
+              <a:rPr lang="en-US" b="1" dirty="0" err="1">
                 <a:solidFill>
                   <a:schemeClr val="accent2"/>
                 </a:solidFill>
@@ -6097,7 +6168,7 @@
               </a:rPr>
               <a:t>e,b</a:t>
             </a:r>
-            <a:endParaRPr lang="en-US" b="1" baseline="30000">
+            <a:endParaRPr lang="en-US" b="1" baseline="30000" dirty="0">
               <a:solidFill>
                 <a:schemeClr val="accent2"/>
               </a:solidFill>
@@ -6116,8 +6187,8 @@
         </p:nvSpPr>
         <p:spPr bwMode="auto">
           <a:xfrm>
-            <a:off x="6019800" y="4876800"/>
-            <a:ext cx="419100" cy="369888"/>
+            <a:off x="6096000" y="3657600"/>
+            <a:ext cx="419100" cy="369332"/>
           </a:xfrm>
           <a:prstGeom prst="rect">
             <a:avLst/>
@@ -6142,7 +6213,7 @@
               </a:spcBef>
             </a:pPr>
             <a:r>
-              <a:rPr lang="en-US" b="1">
+              <a:rPr lang="en-US" b="1" dirty="0">
                 <a:solidFill>
                   <a:schemeClr val="accent2"/>
                 </a:solidFill>
@@ -6151,7 +6222,7 @@
               <a:t>S</a:t>
             </a:r>
             <a:r>
-              <a:rPr lang="en-US" b="1" baseline="30000">
+              <a:rPr lang="en-US" b="1" baseline="30000" dirty="0">
                 <a:solidFill>
                   <a:schemeClr val="accent2"/>
                 </a:solidFill>
@@ -6172,8 +6243,8 @@
         </p:nvSpPr>
         <p:spPr bwMode="auto">
           <a:xfrm>
-            <a:off x="3962400" y="4038600"/>
-            <a:ext cx="307975" cy="369888"/>
+            <a:off x="4038600" y="3581400"/>
+            <a:ext cx="307975" cy="369332"/>
           </a:xfrm>
           <a:prstGeom prst="rect">
             <a:avLst/>
@@ -6198,7 +6269,7 @@
               </a:spcBef>
             </a:pPr>
             <a:r>
-              <a:rPr lang="en-US" b="1">
+              <a:rPr lang="en-US" b="1" dirty="0">
                 <a:solidFill>
                   <a:schemeClr val="accent2"/>
                 </a:solidFill>
@@ -6206,7 +6277,7 @@
               </a:rPr>
               <a:t>P</a:t>
             </a:r>
-            <a:endParaRPr lang="en-US" b="1" baseline="30000">
+            <a:endParaRPr lang="en-US" b="1" baseline="30000" dirty="0">
               <a:solidFill>
                 <a:schemeClr val="accent2"/>
               </a:solidFill>
@@ -6222,9 +6293,9 @@
           <p:nvPr/>
         </p:nvCxnSpPr>
         <p:spPr>
-          <a:xfrm rot="5400000" flipH="1" flipV="1">
-            <a:off x="3318669" y="4448969"/>
-            <a:ext cx="217488" cy="6350"/>
+          <a:xfrm flipV="1">
+            <a:off x="3429000" y="4229101"/>
+            <a:ext cx="0" cy="428624"/>
           </a:xfrm>
           <a:prstGeom prst="straightConnector1">
             <a:avLst/>
@@ -6258,9 +6329,9 @@
           <p:nvPr/>
         </p:nvCxnSpPr>
         <p:spPr>
-          <a:xfrm rot="16200000" flipV="1">
-            <a:off x="2022475" y="5392738"/>
-            <a:ext cx="684213" cy="331787"/>
+          <a:xfrm flipH="1" flipV="1">
+            <a:off x="2209800" y="5257800"/>
+            <a:ext cx="314326" cy="523876"/>
           </a:xfrm>
           <a:prstGeom prst="straightConnector1">
             <a:avLst/>
@@ -6295,7 +6366,7 @@
         </p:nvSpPr>
         <p:spPr>
           <a:xfrm>
-            <a:off x="762000" y="4953000"/>
+            <a:off x="762000" y="4648200"/>
             <a:ext cx="381000" cy="293688"/>
           </a:xfrm>
           <a:prstGeom prst="roundRect">
@@ -6358,7 +6429,7 @@
         </p:nvSpPr>
         <p:spPr>
           <a:xfrm>
-            <a:off x="1143000" y="4953000"/>
+            <a:off x="1143000" y="4648200"/>
             <a:ext cx="381000" cy="293688"/>
           </a:xfrm>
           <a:prstGeom prst="roundRect">
@@ -6421,7 +6492,7 @@
         </p:nvSpPr>
         <p:spPr>
           <a:xfrm>
-            <a:off x="4648200" y="4953000"/>
+            <a:off x="4648200" y="3657600"/>
             <a:ext cx="381000" cy="293688"/>
           </a:xfrm>
           <a:prstGeom prst="roundRect">
@@ -6484,7 +6555,7 @@
         </p:nvSpPr>
         <p:spPr>
           <a:xfrm>
-            <a:off x="2895600" y="4114800"/>
+            <a:off x="2895600" y="3657600"/>
             <a:ext cx="381000" cy="293688"/>
           </a:xfrm>
           <a:prstGeom prst="roundRect">
@@ -6547,7 +6618,7 @@
         </p:nvSpPr>
         <p:spPr>
           <a:xfrm>
-            <a:off x="2514600" y="4953000"/>
+            <a:off x="2514600" y="4648200"/>
             <a:ext cx="381000" cy="293688"/>
           </a:xfrm>
           <a:prstGeom prst="roundRect">
@@ -6609,9 +6680,9 @@
           <p:nvPr/>
         </p:nvCxnSpPr>
         <p:spPr>
-          <a:xfrm rot="16200000" flipV="1">
-            <a:off x="3089275" y="5538788"/>
-            <a:ext cx="633413" cy="7937"/>
+          <a:xfrm flipH="1" flipV="1">
+            <a:off x="3419475" y="5219700"/>
+            <a:ext cx="1" cy="581026"/>
           </a:xfrm>
           <a:prstGeom prst="straightConnector1">
             <a:avLst/>
@@ -6645,9 +6716,9 @@
           <p:nvPr/>
         </p:nvCxnSpPr>
         <p:spPr>
-          <a:xfrm rot="10800000">
-            <a:off x="2209800" y="4876800"/>
-            <a:ext cx="320675" cy="0"/>
+          <a:xfrm flipH="1">
+            <a:off x="2171703" y="4886325"/>
+            <a:ext cx="314322" cy="0"/>
           </a:xfrm>
           <a:prstGeom prst="straightConnector1">
             <a:avLst/>
@@ -6682,8 +6753,8 @@
         </p:nvCxnSpPr>
         <p:spPr>
           <a:xfrm>
-            <a:off x="4343400" y="4876800"/>
-            <a:ext cx="304800" cy="1588"/>
+            <a:off x="4343400" y="4905375"/>
+            <a:ext cx="333375" cy="0"/>
           </a:xfrm>
           <a:prstGeom prst="straightConnector1">
             <a:avLst/>
@@ -6717,9 +6788,9 @@
           <p:nvPr/>
         </p:nvCxnSpPr>
         <p:spPr>
-          <a:xfrm rot="5400000" flipH="1" flipV="1">
-            <a:off x="473869" y="3828257"/>
-            <a:ext cx="1489075" cy="1587"/>
+          <a:xfrm flipV="1">
+            <a:off x="1276350" y="3114676"/>
+            <a:ext cx="0" cy="1552574"/>
           </a:xfrm>
           <a:prstGeom prst="straightConnector1">
             <a:avLst/>
@@ -6754,7 +6825,7 @@
         </p:nvSpPr>
         <p:spPr>
           <a:xfrm>
-            <a:off x="381000" y="4953000"/>
+            <a:off x="381000" y="4648200"/>
             <a:ext cx="381000" cy="293688"/>
           </a:xfrm>
           <a:prstGeom prst="roundRect">
@@ -6817,7 +6888,7 @@
         </p:nvSpPr>
         <p:spPr>
           <a:xfrm>
-            <a:off x="2514600" y="4114800"/>
+            <a:off x="2514600" y="3657600"/>
             <a:ext cx="381000" cy="293688"/>
           </a:xfrm>
           <a:prstGeom prst="roundRect">
@@ -6883,7 +6954,7 @@
         <p:spPr bwMode="auto">
           <a:xfrm>
             <a:off x="304800" y="1524000"/>
-            <a:ext cx="990600" cy="400050"/>
+            <a:ext cx="990600" cy="584775"/>
           </a:xfrm>
           <a:prstGeom prst="rect">
             <a:avLst/>
@@ -6908,14 +6979,20 @@
               </a:spcBef>
             </a:pPr>
             <a:r>
-              <a:rPr lang="en-US" sz="2000" b="1">
+              <a:rPr lang="en-US" sz="1600" b="1" i="1" dirty="0" smtClean="0">
                 <a:solidFill>
                   <a:schemeClr val="accent2"/>
                 </a:solidFill>
                 <a:latin typeface="Calibri" pitchFamily="34" charset="0"/>
               </a:rPr>
-              <a:t>Level I</a:t>
-            </a:r>
+              <a:t>Generic Inversion</a:t>
+            </a:r>
+            <a:endParaRPr lang="en-US" sz="1600" b="1" i="1" dirty="0">
+              <a:solidFill>
+                <a:schemeClr val="accent2"/>
+              </a:solidFill>
+              <a:latin typeface="Calibri" pitchFamily="34" charset="0"/>
+            </a:endParaRPr>
           </a:p>
         </p:txBody>
       </p:sp>
@@ -6930,7 +7007,7 @@
         <p:spPr bwMode="auto">
           <a:xfrm>
             <a:off x="304800" y="3581400"/>
-            <a:ext cx="1066800" cy="400050"/>
+            <a:ext cx="1066800" cy="584775"/>
           </a:xfrm>
           <a:prstGeom prst="rect">
             <a:avLst/>
@@ -6955,14 +7032,20 @@
               </a:spcBef>
             </a:pPr>
             <a:r>
-              <a:rPr lang="en-US" sz="2000" b="1">
+              <a:rPr lang="en-US" sz="1600" b="1" i="1" dirty="0" smtClean="0">
                 <a:solidFill>
                   <a:schemeClr val="accent2"/>
                 </a:solidFill>
                 <a:latin typeface="Calibri" pitchFamily="34" charset="0"/>
               </a:rPr>
-              <a:t>Level II</a:t>
-            </a:r>
+              <a:t>Interface Layer</a:t>
+            </a:r>
+            <a:endParaRPr lang="en-US" sz="1600" b="1" i="1" dirty="0">
+              <a:solidFill>
+                <a:schemeClr val="accent2"/>
+              </a:solidFill>
+              <a:latin typeface="Calibri" pitchFamily="34" charset="0"/>
+            </a:endParaRPr>
           </a:p>
         </p:txBody>
       </p:sp>
@@ -6977,7 +7060,7 @@
         <p:spPr bwMode="auto">
           <a:xfrm>
             <a:off x="304800" y="5715000"/>
-            <a:ext cx="990600" cy="400050"/>
+            <a:ext cx="1447800" cy="584775"/>
           </a:xfrm>
           <a:prstGeom prst="rect">
             <a:avLst/>
@@ -6991,7 +7074,7 @@
           </a:ln>
         </p:spPr>
         <p:txBody>
-          <a:bodyPr>
+          <a:bodyPr wrap="square">
             <a:spAutoFit/>
           </a:bodyPr>
           <a:lstStyle/>
@@ -7002,14 +7085,20 @@
               </a:spcBef>
             </a:pPr>
             <a:r>
-              <a:rPr lang="en-US" sz="2000" b="1">
+              <a:rPr lang="en-US" sz="1600" b="1" i="1" dirty="0" smtClean="0">
                 <a:solidFill>
                   <a:schemeClr val="accent2"/>
                 </a:solidFill>
                 <a:latin typeface="Calibri" pitchFamily="34" charset="0"/>
               </a:rPr>
-              <a:t>Level III</a:t>
-            </a:r>
+              <a:t>Numerical Discretization</a:t>
+            </a:r>
+            <a:endParaRPr lang="en-US" sz="1600" b="1" i="1" dirty="0">
+              <a:solidFill>
+                <a:schemeClr val="accent2"/>
+              </a:solidFill>
+              <a:latin typeface="Calibri" pitchFamily="34" charset="0"/>
+            </a:endParaRPr>
           </a:p>
         </p:txBody>
       </p:sp>
@@ -7020,9 +7109,9 @@
           <p:nvPr/>
         </p:nvCxnSpPr>
         <p:spPr>
-          <a:xfrm rot="16200000" flipV="1">
-            <a:off x="4171950" y="3257550"/>
-            <a:ext cx="647700" cy="304800"/>
+          <a:xfrm flipH="1" flipV="1">
+            <a:off x="4314826" y="3095626"/>
+            <a:ext cx="409574" cy="638174"/>
           </a:xfrm>
           <a:prstGeom prst="straightConnector1">
             <a:avLst/>
@@ -7059,8 +7148,8 @@
         </p:nvSpPr>
         <p:spPr bwMode="auto">
           <a:xfrm>
-            <a:off x="1600200" y="4876800"/>
-            <a:ext cx="558800" cy="369888"/>
+            <a:off x="1552575" y="4572000"/>
+            <a:ext cx="711200" cy="369332"/>
           </a:xfrm>
           <a:prstGeom prst="rect">
             <a:avLst/>
@@ -7074,7 +7163,7 @@
           </a:ln>
         </p:spPr>
         <p:txBody>
-          <a:bodyPr>
+          <a:bodyPr wrap="square">
             <a:spAutoFit/>
           </a:bodyPr>
           <a:lstStyle/>
@@ -7100,7 +7189,43 @@
                 </a:solidFill>
                 <a:latin typeface="Calibri" pitchFamily="34" charset="0"/>
               </a:rPr>
-              <a:t>,A</a:t>
+              <a:t>,</a:t>
+            </a:r>
+            <a:r>
+              <a:rPr lang="en-US" b="1" dirty="0" err="1" smtClean="0">
+                <a:solidFill>
+                  <a:schemeClr val="accent2"/>
+                </a:solidFill>
+                <a:latin typeface="Calibri" pitchFamily="34" charset="0"/>
+              </a:rPr>
+              <a:t>l</a:t>
+            </a:r>
+            <a:r>
+              <a:rPr lang="en-US" b="1" baseline="-25000" dirty="0" err="1" smtClean="0">
+                <a:solidFill>
+                  <a:schemeClr val="accent2"/>
+                </a:solidFill>
+                <a:latin typeface="Calibri" pitchFamily="34" charset="0"/>
+              </a:rPr>
+              <a:t>j</a:t>
+            </a:r>
+            <a:r>
+              <a:rPr lang="en-US" b="1" dirty="0" err="1" smtClean="0">
+                <a:solidFill>
+                  <a:schemeClr val="accent2"/>
+                </a:solidFill>
+                <a:latin typeface="Calibri" pitchFamily="34" charset="0"/>
+              </a:rPr>
+              <a:t>,q</a:t>
+            </a:r>
+            <a:r>
+              <a:rPr lang="en-US" b="1" baseline="-25000" dirty="0" err="1" smtClean="0">
+                <a:solidFill>
+                  <a:schemeClr val="accent2"/>
+                </a:solidFill>
+                <a:latin typeface="Calibri" pitchFamily="34" charset="0"/>
+              </a:rPr>
+              <a:t>j</a:t>
             </a:r>
             <a:endParaRPr lang="en-US" b="1" baseline="30000" dirty="0">
               <a:solidFill>
@@ -7119,7 +7244,7 @@
         </p:nvCxnSpPr>
         <p:spPr>
           <a:xfrm>
-            <a:off x="2209800" y="7010400"/>
+            <a:off x="2209800" y="7010401"/>
             <a:ext cx="304800" cy="1588"/>
           </a:xfrm>
           <a:prstGeom prst="straightConnector1">
@@ -7154,9 +7279,9 @@
           <p:nvPr/>
         </p:nvCxnSpPr>
         <p:spPr>
-          <a:xfrm rot="5400000" flipH="1" flipV="1">
-            <a:off x="3282156" y="6593682"/>
-            <a:ext cx="217487" cy="6350"/>
+          <a:xfrm flipV="1">
+            <a:off x="3390900" y="6429375"/>
+            <a:ext cx="3" cy="342900"/>
           </a:xfrm>
           <a:prstGeom prst="straightConnector1">
             <a:avLst/>
@@ -7191,8 +7316,8 @@
         </p:nvSpPr>
         <p:spPr>
           <a:xfrm>
-            <a:off x="4953000" y="2590800"/>
-            <a:ext cx="762000" cy="277812"/>
+            <a:off x="4953000" y="2667000"/>
+            <a:ext cx="762000" cy="276999"/>
           </a:xfrm>
           <a:prstGeom prst="rect">
             <a:avLst/>
@@ -7241,8 +7366,8 @@
         </p:nvSpPr>
         <p:spPr bwMode="auto">
           <a:xfrm>
-            <a:off x="5715000" y="1828800"/>
-            <a:ext cx="762000" cy="707886"/>
+            <a:off x="5715000" y="2133600"/>
+            <a:ext cx="762000" cy="400110"/>
           </a:xfrm>
           <a:prstGeom prst="rect">
             <a:avLst/>
@@ -7267,7 +7392,7 @@
               </a:spcBef>
             </a:pPr>
             <a:r>
-              <a:rPr lang="en-US" sz="2000" dirty="0">
+              <a:rPr lang="en-US" sz="2000" b="1" dirty="0" smtClean="0">
                 <a:solidFill>
                   <a:schemeClr val="tx1">
                     <a:lumMod val="50000"/>
@@ -7276,8 +7401,17 @@
                 </a:solidFill>
                 <a:latin typeface="Calibri" pitchFamily="34" charset="0"/>
               </a:rPr>
-              <a:t>MPI Main</a:t>
-            </a:r>
+              <a:t>MPI</a:t>
+            </a:r>
+            <a:endParaRPr lang="en-US" sz="2000" b="1" dirty="0">
+              <a:solidFill>
+                <a:schemeClr val="tx1">
+                  <a:lumMod val="50000"/>
+                  <a:lumOff val="50000"/>
+                </a:schemeClr>
+              </a:solidFill>
+              <a:latin typeface="Calibri" pitchFamily="34" charset="0"/>
+            </a:endParaRPr>
           </a:p>
         </p:txBody>
       </p:sp>
@@ -7289,8 +7423,8 @@
         </p:nvSpPr>
         <p:spPr>
           <a:xfrm>
-            <a:off x="4953000" y="1828800"/>
-            <a:ext cx="762000" cy="277813"/>
+            <a:off x="4953000" y="1828801"/>
+            <a:ext cx="762000" cy="276999"/>
           </a:xfrm>
           <a:prstGeom prst="rect">
             <a:avLst/>
@@ -7338,9 +7472,9 @@
           <p:nvPr/>
         </p:nvCxnSpPr>
         <p:spPr>
-          <a:xfrm rot="10800000" flipV="1">
-            <a:off x="4324350" y="1967707"/>
-            <a:ext cx="628650" cy="3968"/>
+          <a:xfrm flipH="1">
+            <a:off x="4238625" y="1967301"/>
+            <a:ext cx="714375" cy="4374"/>
           </a:xfrm>
           <a:prstGeom prst="straightConnector1">
             <a:avLst/>
@@ -7377,9 +7511,9 @@
           <p:nvPr/>
         </p:nvCxnSpPr>
         <p:spPr>
-          <a:xfrm rot="5400000" flipH="1" flipV="1">
-            <a:off x="5158583" y="2339182"/>
-            <a:ext cx="484187" cy="1588"/>
+          <a:xfrm flipH="1" flipV="1">
+            <a:off x="5401472" y="2097885"/>
+            <a:ext cx="8728" cy="540540"/>
           </a:xfrm>
           <a:prstGeom prst="straightConnector1">
             <a:avLst/>
@@ -7415,9 +7549,9 @@
           <p:nvPr/>
         </p:nvCxnSpPr>
         <p:spPr>
-          <a:xfrm rot="16200000" flipV="1">
-            <a:off x="5024442" y="2338388"/>
-            <a:ext cx="476249" cy="9526"/>
+          <a:xfrm flipV="1">
+            <a:off x="5257803" y="2105028"/>
+            <a:ext cx="2" cy="542922"/>
           </a:xfrm>
           <a:prstGeom prst="straightConnector1">
             <a:avLst/>
@@ -7451,14 +7585,14 @@
         <p:nvCxnSpPr>
           <p:cNvPr id="100" name="Straight Arrow Connector 69"/>
           <p:cNvCxnSpPr>
-            <a:endCxn id="3104" idx="3"/>
+            <a:stCxn id="82" idx="1"/>
           </p:cNvCxnSpPr>
           <p:nvPr/>
         </p:nvCxnSpPr>
         <p:spPr>
-          <a:xfrm rot="10800000">
-            <a:off x="4343401" y="2760664"/>
-            <a:ext cx="600075" cy="1587"/>
+          <a:xfrm flipH="1" flipV="1">
+            <a:off x="4276725" y="2800350"/>
+            <a:ext cx="676275" cy="5150"/>
           </a:xfrm>
           <a:prstGeom prst="straightConnector1">
             <a:avLst/>
@@ -7495,9 +7629,9 @@
           <p:nvPr/>
         </p:nvCxnSpPr>
         <p:spPr>
-          <a:xfrm rot="5400000" flipH="1" flipV="1">
-            <a:off x="3323432" y="2315368"/>
-            <a:ext cx="217487" cy="6350"/>
+          <a:xfrm flipH="1" flipV="1">
+            <a:off x="3409955" y="2133601"/>
+            <a:ext cx="9520" cy="409574"/>
           </a:xfrm>
           <a:prstGeom prst="straightConnector1">
             <a:avLst/>
@@ -7593,7 +7727,7 @@
         </p:nvSpPr>
         <p:spPr>
           <a:xfrm>
-            <a:off x="3124200" y="4876800"/>
+            <a:off x="3733800" y="4953000"/>
             <a:ext cx="685800" cy="338554"/>
           </a:xfrm>
           <a:prstGeom prst="rect">
@@ -7717,8 +7851,8 @@
         </p:nvSpPr>
         <p:spPr bwMode="auto">
           <a:xfrm>
-            <a:off x="4648200" y="1600200"/>
-            <a:ext cx="1828800" cy="1492250"/>
+            <a:off x="4619625" y="1524000"/>
+            <a:ext cx="1914525" cy="1676400"/>
           </a:xfrm>
           <a:prstGeom prst="rect">
             <a:avLst/>
@@ -7743,6 +7877,209 @@
           <a:lstStyle/>
           <a:p>
             <a:endParaRPr lang="en-US" dirty="0">
+              <a:latin typeface="Calibri" pitchFamily="34" charset="0"/>
+            </a:endParaRPr>
+          </a:p>
+        </p:txBody>
+      </p:sp>
+      <p:sp>
+        <p:nvSpPr>
+          <p:cNvPr id="89" name="Text Box 28"/>
+          <p:cNvSpPr txBox="1">
+            <a:spLocks noChangeArrowheads="1"/>
+          </p:cNvSpPr>
+          <p:nvPr/>
+        </p:nvSpPr>
+        <p:spPr bwMode="auto">
+          <a:xfrm>
+            <a:off x="304800" y="8001000"/>
+            <a:ext cx="1981200" cy="523220"/>
+          </a:xfrm>
+          <a:prstGeom prst="rect">
+            <a:avLst/>
+          </a:prstGeom>
+          <a:noFill/>
+          <a:ln w="9525">
+            <a:noFill/>
+            <a:miter lim="800000"/>
+            <a:headEnd/>
+            <a:tailEnd/>
+          </a:ln>
+        </p:spPr>
+        <p:txBody>
+          <a:bodyPr wrap="square">
+            <a:spAutoFit/>
+          </a:bodyPr>
+          <a:lstStyle/>
+          <a:p>
+            <a:pPr algn="ctr">
+              <a:spcBef>
+                <a:spcPct val="50000"/>
+              </a:spcBef>
+            </a:pPr>
+            <a:r>
+              <a:rPr lang="en-US" sz="1400" dirty="0" smtClean="0">
+                <a:latin typeface="Calibri" pitchFamily="34" charset="0"/>
+              </a:rPr>
+              <a:t>Model parameter vector space; regularization</a:t>
+            </a:r>
+            <a:endParaRPr lang="en-US" sz="1400" dirty="0">
+              <a:latin typeface="Calibri" pitchFamily="34" charset="0"/>
+            </a:endParaRPr>
+          </a:p>
+        </p:txBody>
+      </p:sp>
+      <p:sp>
+        <p:nvSpPr>
+          <p:cNvPr id="90" name="Text Box 28"/>
+          <p:cNvSpPr txBox="1">
+            <a:spLocks noChangeArrowheads="1"/>
+          </p:cNvSpPr>
+          <p:nvPr/>
+        </p:nvSpPr>
+        <p:spPr bwMode="auto">
+          <a:xfrm>
+            <a:off x="4724400" y="4572000"/>
+            <a:ext cx="1752600" cy="738664"/>
+          </a:xfrm>
+          <a:prstGeom prst="rect">
+            <a:avLst/>
+          </a:prstGeom>
+          <a:noFill/>
+          <a:ln w="9525">
+            <a:noFill/>
+            <a:miter lim="800000"/>
+            <a:headEnd/>
+            <a:tailEnd/>
+          </a:ln>
+        </p:spPr>
+        <p:txBody>
+          <a:bodyPr wrap="square">
+            <a:spAutoFit/>
+          </a:bodyPr>
+          <a:lstStyle/>
+          <a:p>
+            <a:pPr algn="ctr">
+              <a:spcBef>
+                <a:spcPct val="50000"/>
+              </a:spcBef>
+            </a:pPr>
+            <a:r>
+              <a:rPr lang="en-US" sz="1400" dirty="0" smtClean="0">
+                <a:latin typeface="Calibri" pitchFamily="34" charset="0"/>
+              </a:rPr>
+              <a:t>Set sources, BCs, efficiently manage multiple TX</a:t>
+            </a:r>
+            <a:endParaRPr lang="en-US" sz="1400" dirty="0">
+              <a:latin typeface="Calibri" pitchFamily="34" charset="0"/>
+            </a:endParaRPr>
+          </a:p>
+        </p:txBody>
+      </p:sp>
+      <p:sp>
+        <p:nvSpPr>
+          <p:cNvPr id="91" name="Rectangle 90"/>
+          <p:cNvSpPr/>
+          <p:nvPr/>
+        </p:nvSpPr>
+        <p:spPr>
+          <a:xfrm>
+            <a:off x="4600575" y="6705600"/>
+            <a:ext cx="1285929" cy="338554"/>
+          </a:xfrm>
+          <a:prstGeom prst="rect">
+            <a:avLst/>
+          </a:prstGeom>
+        </p:spPr>
+        <p:txBody>
+          <a:bodyPr wrap="none">
+            <a:spAutoFit/>
+          </a:bodyPr>
+          <a:lstStyle/>
+          <a:p>
+            <a:r>
+              <a:rPr lang="en-US" sz="1600" b="1" dirty="0" smtClean="0">
+                <a:latin typeface="Calibri" pitchFamily="34" charset="0"/>
+              </a:rPr>
+              <a:t>Model Map.:</a:t>
+            </a:r>
+            <a:endParaRPr lang="en-US" sz="1600" b="1" dirty="0"/>
+          </a:p>
+        </p:txBody>
+      </p:sp>
+      <p:sp>
+        <p:nvSpPr>
+          <p:cNvPr id="92" name="Rectangle 91"/>
+          <p:cNvSpPr/>
+          <p:nvPr/>
+        </p:nvSpPr>
+        <p:spPr>
+          <a:xfrm>
+            <a:off x="2466975" y="5686425"/>
+            <a:ext cx="1563633" cy="338554"/>
+          </a:xfrm>
+          <a:prstGeom prst="rect">
+            <a:avLst/>
+          </a:prstGeom>
+        </p:spPr>
+        <p:txBody>
+          <a:bodyPr wrap="none">
+            <a:spAutoFit/>
+          </a:bodyPr>
+          <a:lstStyle/>
+          <a:p>
+            <a:r>
+              <a:rPr lang="en-US" sz="1600" b="1" dirty="0" smtClean="0">
+                <a:latin typeface="Calibri" pitchFamily="34" charset="0"/>
+              </a:rPr>
+              <a:t>EM field Interp.:</a:t>
+            </a:r>
+            <a:endParaRPr lang="en-US" sz="1600" b="1" dirty="0"/>
+          </a:p>
+        </p:txBody>
+      </p:sp>
+      <p:sp>
+        <p:nvSpPr>
+          <p:cNvPr id="93" name="Text Box 28"/>
+          <p:cNvSpPr txBox="1">
+            <a:spLocks noChangeArrowheads="1"/>
+          </p:cNvSpPr>
+          <p:nvPr/>
+        </p:nvSpPr>
+        <p:spPr bwMode="auto">
+          <a:xfrm>
+            <a:off x="228600" y="533400"/>
+            <a:ext cx="1981200" cy="523220"/>
+          </a:xfrm>
+          <a:prstGeom prst="rect">
+            <a:avLst/>
+          </a:prstGeom>
+          <a:noFill/>
+          <a:ln w="9525">
+            <a:noFill/>
+            <a:miter lim="800000"/>
+            <a:headEnd/>
+            <a:tailEnd/>
+          </a:ln>
+        </p:spPr>
+        <p:txBody>
+          <a:bodyPr wrap="square">
+            <a:spAutoFit/>
+          </a:bodyPr>
+          <a:lstStyle/>
+          <a:p>
+            <a:pPr algn="ctr">
+              <a:spcBef>
+                <a:spcPct val="50000"/>
+              </a:spcBef>
+            </a:pPr>
+            <a:r>
+              <a:rPr lang="en-US" sz="1400" dirty="0" smtClean="0">
+                <a:latin typeface="Calibri" pitchFamily="34" charset="0"/>
+              </a:rPr>
+              <a:t>Data vector space, organized by TX,RX</a:t>
+            </a:r>
+            <a:endParaRPr lang="en-US" sz="1400" dirty="0">
               <a:latin typeface="Calibri" pitchFamily="34" charset="0"/>
             </a:endParaRPr>
           </a:p>

</xml_diff>